<commit_message>
updated with review comments
</commit_message>
<xml_diff>
--- a/LendingClubCaseStudy.pptx
+++ b/LendingClubCaseStudy.pptx
@@ -24168,7 +24168,7 @@
             <a:pPr lvl="1"/>
             <a:r>
               <a:rPr lang="en-US" sz="2000" dirty="0"/>
-              <a:t>Drop columns with with few values or not be useful for analysis</a:t>
+              <a:t>Drop columns with few values or not be useful for analysis</a:t>
             </a:r>
           </a:p>
           <a:p>
@@ -25039,15 +25039,7 @@
           <a:p>
             <a:r>
               <a:rPr lang="en-US" sz="2400" dirty="0"/>
-              <a:t>The following variables were considered for Univariate </a:t>
-            </a:r>
-            <a:r>
-              <a:rPr lang="en-US" sz="2400" dirty="0" err="1"/>
-              <a:t>Anlysis</a:t>
-            </a:r>
-            <a:r>
-              <a:rPr lang="en-US" sz="2400" dirty="0"/>
-              <a:t>:</a:t>
+              <a:t>The following variables were considered for Univariate Analysis:</a:t>
             </a:r>
           </a:p>
           <a:p>

</xml_diff>